<commit_message>
everything "works", plz dont break
</commit_message>
<xml_diff>
--- a/Prison Runner.pptx
+++ b/Prison Runner.pptx
@@ -265,7 +265,7 @@
           <a:p>
             <a:fld id="{34B73A4D-71B2-445B-81B6-6B4DE51B0FAB}" type="datetimeFigureOut">
               <a:rPr lang="en-GB" smtClean="0"/>
-              <a:t>19/11/2019</a:t>
+              <a:t>20/11/2019</a:t>
             </a:fld>
             <a:endParaRPr lang="en-GB"/>
           </a:p>
@@ -465,7 +465,7 @@
           <a:p>
             <a:fld id="{34B73A4D-71B2-445B-81B6-6B4DE51B0FAB}" type="datetimeFigureOut">
               <a:rPr lang="en-GB" smtClean="0"/>
-              <a:t>19/11/2019</a:t>
+              <a:t>20/11/2019</a:t>
             </a:fld>
             <a:endParaRPr lang="en-GB"/>
           </a:p>
@@ -675,7 +675,7 @@
           <a:p>
             <a:fld id="{34B73A4D-71B2-445B-81B6-6B4DE51B0FAB}" type="datetimeFigureOut">
               <a:rPr lang="en-GB" smtClean="0"/>
-              <a:t>19/11/2019</a:t>
+              <a:t>20/11/2019</a:t>
             </a:fld>
             <a:endParaRPr lang="en-GB"/>
           </a:p>
@@ -875,7 +875,7 @@
           <a:p>
             <a:fld id="{34B73A4D-71B2-445B-81B6-6B4DE51B0FAB}" type="datetimeFigureOut">
               <a:rPr lang="en-GB" smtClean="0"/>
-              <a:t>19/11/2019</a:t>
+              <a:t>20/11/2019</a:t>
             </a:fld>
             <a:endParaRPr lang="en-GB"/>
           </a:p>
@@ -1151,7 +1151,7 @@
           <a:p>
             <a:fld id="{34B73A4D-71B2-445B-81B6-6B4DE51B0FAB}" type="datetimeFigureOut">
               <a:rPr lang="en-GB" smtClean="0"/>
-              <a:t>19/11/2019</a:t>
+              <a:t>20/11/2019</a:t>
             </a:fld>
             <a:endParaRPr lang="en-GB"/>
           </a:p>
@@ -1419,7 +1419,7 @@
           <a:p>
             <a:fld id="{34B73A4D-71B2-445B-81B6-6B4DE51B0FAB}" type="datetimeFigureOut">
               <a:rPr lang="en-GB" smtClean="0"/>
-              <a:t>19/11/2019</a:t>
+              <a:t>20/11/2019</a:t>
             </a:fld>
             <a:endParaRPr lang="en-GB"/>
           </a:p>
@@ -1834,7 +1834,7 @@
           <a:p>
             <a:fld id="{34B73A4D-71B2-445B-81B6-6B4DE51B0FAB}" type="datetimeFigureOut">
               <a:rPr lang="en-GB" smtClean="0"/>
-              <a:t>19/11/2019</a:t>
+              <a:t>20/11/2019</a:t>
             </a:fld>
             <a:endParaRPr lang="en-GB"/>
           </a:p>
@@ -1976,7 +1976,7 @@
           <a:p>
             <a:fld id="{34B73A4D-71B2-445B-81B6-6B4DE51B0FAB}" type="datetimeFigureOut">
               <a:rPr lang="en-GB" smtClean="0"/>
-              <a:t>19/11/2019</a:t>
+              <a:t>20/11/2019</a:t>
             </a:fld>
             <a:endParaRPr lang="en-GB"/>
           </a:p>
@@ -2089,7 +2089,7 @@
           <a:p>
             <a:fld id="{34B73A4D-71B2-445B-81B6-6B4DE51B0FAB}" type="datetimeFigureOut">
               <a:rPr lang="en-GB" smtClean="0"/>
-              <a:t>19/11/2019</a:t>
+              <a:t>20/11/2019</a:t>
             </a:fld>
             <a:endParaRPr lang="en-GB"/>
           </a:p>
@@ -2402,7 +2402,7 @@
           <a:p>
             <a:fld id="{34B73A4D-71B2-445B-81B6-6B4DE51B0FAB}" type="datetimeFigureOut">
               <a:rPr lang="en-GB" smtClean="0"/>
-              <a:t>19/11/2019</a:t>
+              <a:t>20/11/2019</a:t>
             </a:fld>
             <a:endParaRPr lang="en-GB"/>
           </a:p>
@@ -2691,7 +2691,7 @@
           <a:p>
             <a:fld id="{34B73A4D-71B2-445B-81B6-6B4DE51B0FAB}" type="datetimeFigureOut">
               <a:rPr lang="en-GB" smtClean="0"/>
-              <a:t>19/11/2019</a:t>
+              <a:t>20/11/2019</a:t>
             </a:fld>
             <a:endParaRPr lang="en-GB"/>
           </a:p>
@@ -2934,7 +2934,7 @@
           <a:p>
             <a:fld id="{34B73A4D-71B2-445B-81B6-6B4DE51B0FAB}" type="datetimeFigureOut">
               <a:rPr lang="en-GB" smtClean="0"/>
-              <a:t>19/11/2019</a:t>
+              <a:t>20/11/2019</a:t>
             </a:fld>
             <a:endParaRPr lang="en-GB"/>
           </a:p>
@@ -6050,7 +6050,7 @@
           <a:p>
             <a:r>
               <a:rPr lang="en-GB" dirty="0"/>
-              <a:t>Game</a:t>
+              <a:t>Our Game</a:t>
             </a:r>
           </a:p>
         </p:txBody>
@@ -6085,13 +6085,8 @@
           <a:p>
             <a:r>
               <a:rPr lang="en-GB" sz="1800" dirty="0"/>
-              <a:t>We made </a:t>
-            </a:r>
-            <a:r>
-              <a:rPr lang="en-GB" sz="1800"/>
-              <a:t>a game.</a:t>
-            </a:r>
-            <a:endParaRPr lang="en-GB" sz="1800" dirty="0"/>
+              <a:t>We made a game, somehow. We over scoped a lot for the time we were given and a lot of small things took longer to do than we thought. So near the end we had to scrap a lot of features we wanted to include, with this we also loss a few of the creative cards.  </a:t>
+            </a:r>
           </a:p>
         </p:txBody>
       </p:sp>
@@ -6958,21 +6953,6 @@
 </file>
 
 <file path=customXml/item1.xml><?xml version="1.0" encoding="utf-8"?>
-<p:properties xmlns:p="http://schemas.microsoft.com/office/2006/metadata/properties" xmlns:xsi="http://www.w3.org/2001/XMLSchema-instance" xmlns:pc="http://schemas.microsoft.com/office/infopath/2007/PartnerControls">
-  <documentManagement/>
-</p:properties>
-</file>
-
-<file path=customXml/item2.xml><?xml version="1.0" encoding="utf-8"?>
-<?mso-contentType ?>
-<FormTemplates xmlns="http://schemas.microsoft.com/sharepoint/v3/contenttype/forms">
-  <Display>DocumentLibraryForm</Display>
-  <Edit>DocumentLibraryForm</Edit>
-  <New>DocumentLibraryForm</New>
-</FormTemplates>
-</file>
-
-<file path=customXml/item3.xml><?xml version="1.0" encoding="utf-8"?>
 <ct:contentTypeSchema xmlns:ct="http://schemas.microsoft.com/office/2006/metadata/contentType" xmlns:ma="http://schemas.microsoft.com/office/2006/metadata/properties/metaAttributes" ct:_="" ma:_="" ma:contentTypeName="Document" ma:contentTypeID="0x010100B3A88E0B3578434CBAACF45C720D4C49" ma:contentTypeVersion="7" ma:contentTypeDescription="Create a new document." ma:contentTypeScope="" ma:versionID="161c32630e20638a364d04718d168832">
   <xsd:schema xmlns:xsd="http://www.w3.org/2001/XMLSchema" xmlns:xs="http://www.w3.org/2001/XMLSchema" xmlns:p="http://schemas.microsoft.com/office/2006/metadata/properties" xmlns:ns3="ea17db8b-5748-486d-b3e0-8dbef2f84e62" targetNamespace="http://schemas.microsoft.com/office/2006/metadata/properties" ma:root="true" ma:fieldsID="8c0c9afe68b1149e7ecb66a39f619467" ns3:_="">
     <xsd:import namespace="ea17db8b-5748-486d-b3e0-8dbef2f84e62"/>
@@ -7136,31 +7116,22 @@
 </ct:contentTypeSchema>
 </file>
 
-<file path=customXml/itemProps1.xml><?xml version="1.0" encoding="utf-8"?>
-<ds:datastoreItem xmlns:ds="http://schemas.openxmlformats.org/officeDocument/2006/customXml" ds:itemID="{60E8A4E8-88A0-40D3-AC4D-E470CE879DC8}">
-  <ds:schemaRefs>
-    <ds:schemaRef ds:uri="ea17db8b-5748-486d-b3e0-8dbef2f84e62"/>
-    <ds:schemaRef ds:uri="http://www.w3.org/XML/1998/namespace"/>
-    <ds:schemaRef ds:uri="http://purl.org/dc/dcmitype/"/>
-    <ds:schemaRef ds:uri="http://schemas.openxmlformats.org/package/2006/metadata/core-properties"/>
-    <ds:schemaRef ds:uri="http://schemas.microsoft.com/office/2006/metadata/properties"/>
-    <ds:schemaRef ds:uri="http://purl.org/dc/elements/1.1/"/>
-    <ds:schemaRef ds:uri="http://schemas.microsoft.com/office/2006/documentManagement/types"/>
-    <ds:schemaRef ds:uri="http://schemas.microsoft.com/office/infopath/2007/PartnerControls"/>
-    <ds:schemaRef ds:uri="http://purl.org/dc/terms/"/>
-  </ds:schemaRefs>
-</ds:datastoreItem>
+<file path=customXml/item2.xml><?xml version="1.0" encoding="utf-8"?>
+<?mso-contentType ?>
+<FormTemplates xmlns="http://schemas.microsoft.com/sharepoint/v3/contenttype/forms">
+  <Display>DocumentLibraryForm</Display>
+  <Edit>DocumentLibraryForm</Edit>
+  <New>DocumentLibraryForm</New>
+</FormTemplates>
 </file>
 
-<file path=customXml/itemProps2.xml><?xml version="1.0" encoding="utf-8"?>
-<ds:datastoreItem xmlns:ds="http://schemas.openxmlformats.org/officeDocument/2006/customXml" ds:itemID="{0F02F05A-7A54-4902-BACF-DF9411922F8A}">
-  <ds:schemaRefs>
-    <ds:schemaRef ds:uri="http://schemas.microsoft.com/sharepoint/v3/contenttype/forms"/>
-  </ds:schemaRefs>
-</ds:datastoreItem>
+<file path=customXml/item3.xml><?xml version="1.0" encoding="utf-8"?>
+<p:properties xmlns:p="http://schemas.microsoft.com/office/2006/metadata/properties" xmlns:xsi="http://www.w3.org/2001/XMLSchema-instance" xmlns:pc="http://schemas.microsoft.com/office/infopath/2007/PartnerControls">
+  <documentManagement/>
+</p:properties>
 </file>
 
-<file path=customXml/itemProps3.xml><?xml version="1.0" encoding="utf-8"?>
+<file path=customXml/itemProps1.xml><?xml version="1.0" encoding="utf-8"?>
 <ds:datastoreItem xmlns:ds="http://schemas.openxmlformats.org/officeDocument/2006/customXml" ds:itemID="{CC5D012D-61E8-4F7D-B565-0B39F9B0FB09}">
   <ds:schemaRefs>
     <ds:schemaRef ds:uri="http://schemas.microsoft.com/office/2006/metadata/contentType"/>
@@ -7176,4 +7147,28 @@
     <ds:schemaRef ds:uri="http://schemas.microsoft.com/internal/obd"/>
   </ds:schemaRefs>
 </ds:datastoreItem>
+</file>
+
+<file path=customXml/itemProps2.xml><?xml version="1.0" encoding="utf-8"?>
+<ds:datastoreItem xmlns:ds="http://schemas.openxmlformats.org/officeDocument/2006/customXml" ds:itemID="{0F02F05A-7A54-4902-BACF-DF9411922F8A}">
+  <ds:schemaRefs>
+    <ds:schemaRef ds:uri="http://schemas.microsoft.com/sharepoint/v3/contenttype/forms"/>
+  </ds:schemaRefs>
+</ds:datastoreItem>
+</file>
+
+<file path=customXml/itemProps3.xml><?xml version="1.0" encoding="utf-8"?>
+<ds:datastoreItem xmlns:ds="http://schemas.openxmlformats.org/officeDocument/2006/customXml" ds:itemID="{60E8A4E8-88A0-40D3-AC4D-E470CE879DC8}">
+  <ds:schemaRefs>
+    <ds:schemaRef ds:uri="ea17db8b-5748-486d-b3e0-8dbef2f84e62"/>
+    <ds:schemaRef ds:uri="http://www.w3.org/XML/1998/namespace"/>
+    <ds:schemaRef ds:uri="http://purl.org/dc/dcmitype/"/>
+    <ds:schemaRef ds:uri="http://schemas.openxmlformats.org/package/2006/metadata/core-properties"/>
+    <ds:schemaRef ds:uri="http://schemas.microsoft.com/office/2006/metadata/properties"/>
+    <ds:schemaRef ds:uri="http://purl.org/dc/elements/1.1/"/>
+    <ds:schemaRef ds:uri="http://schemas.microsoft.com/office/2006/documentManagement/types"/>
+    <ds:schemaRef ds:uri="http://schemas.microsoft.com/office/infopath/2007/PartnerControls"/>
+    <ds:schemaRef ds:uri="http://purl.org/dc/terms/"/>
+  </ds:schemaRefs>
+</ds:datastoreItem>
 </file>
</xml_diff>